<commit_message>
fixed rounding on shiny app
</commit_message>
<xml_diff>
--- a/Project Presentation.pptx
+++ b/Project Presentation.pptx
@@ -273,7 +273,7 @@
           <a:p>
             <a:fld id="{6869F073-CFE0-40B3-AEDA-CB2789305C2A}" type="datetimeFigureOut">
               <a:rPr lang="en-GB" smtClean="0"/>
-              <a:t>03/03/20</a:t>
+              <a:t>04/03/20</a:t>
             </a:fld>
             <a:endParaRPr lang="en-GB"/>
           </a:p>
@@ -438,7 +438,7 @@
           <a:p>
             <a:fld id="{6869F073-CFE0-40B3-AEDA-CB2789305C2A}" type="datetimeFigureOut">
               <a:rPr lang="en-GB" smtClean="0"/>
-              <a:t>03/03/20</a:t>
+              <a:t>04/03/20</a:t>
             </a:fld>
             <a:endParaRPr lang="en-GB"/>
           </a:p>
@@ -613,7 +613,7 @@
           <a:p>
             <a:fld id="{6869F073-CFE0-40B3-AEDA-CB2789305C2A}" type="datetimeFigureOut">
               <a:rPr lang="en-GB" smtClean="0"/>
-              <a:t>03/03/20</a:t>
+              <a:t>04/03/20</a:t>
             </a:fld>
             <a:endParaRPr lang="en-GB"/>
           </a:p>
@@ -778,7 +778,7 @@
           <a:p>
             <a:fld id="{6869F073-CFE0-40B3-AEDA-CB2789305C2A}" type="datetimeFigureOut">
               <a:rPr lang="en-GB" smtClean="0"/>
-              <a:t>03/03/20</a:t>
+              <a:t>04/03/20</a:t>
             </a:fld>
             <a:endParaRPr lang="en-GB"/>
           </a:p>
@@ -1019,7 +1019,7 @@
           <a:p>
             <a:fld id="{6869F073-CFE0-40B3-AEDA-CB2789305C2A}" type="datetimeFigureOut">
               <a:rPr lang="en-GB" smtClean="0"/>
-              <a:t>03/03/20</a:t>
+              <a:t>04/03/20</a:t>
             </a:fld>
             <a:endParaRPr lang="en-GB"/>
           </a:p>
@@ -1246,7 +1246,7 @@
           <a:p>
             <a:fld id="{6869F073-CFE0-40B3-AEDA-CB2789305C2A}" type="datetimeFigureOut">
               <a:rPr lang="en-GB" smtClean="0"/>
-              <a:t>03/03/20</a:t>
+              <a:t>04/03/20</a:t>
             </a:fld>
             <a:endParaRPr lang="en-GB"/>
           </a:p>
@@ -1608,7 +1608,7 @@
           <a:p>
             <a:fld id="{6869F073-CFE0-40B3-AEDA-CB2789305C2A}" type="datetimeFigureOut">
               <a:rPr lang="en-GB" smtClean="0"/>
-              <a:t>03/03/20</a:t>
+              <a:t>04/03/20</a:t>
             </a:fld>
             <a:endParaRPr lang="en-GB"/>
           </a:p>
@@ -1721,7 +1721,7 @@
           <a:p>
             <a:fld id="{6869F073-CFE0-40B3-AEDA-CB2789305C2A}" type="datetimeFigureOut">
               <a:rPr lang="en-GB" smtClean="0"/>
-              <a:t>03/03/20</a:t>
+              <a:t>04/03/20</a:t>
             </a:fld>
             <a:endParaRPr lang="en-GB"/>
           </a:p>
@@ -1811,7 +1811,7 @@
           <a:p>
             <a:fld id="{6869F073-CFE0-40B3-AEDA-CB2789305C2A}" type="datetimeFigureOut">
               <a:rPr lang="en-GB" smtClean="0"/>
-              <a:t>03/03/20</a:t>
+              <a:t>04/03/20</a:t>
             </a:fld>
             <a:endParaRPr lang="en-GB"/>
           </a:p>
@@ -2083,7 +2083,7 @@
           <a:p>
             <a:fld id="{6869F073-CFE0-40B3-AEDA-CB2789305C2A}" type="datetimeFigureOut">
               <a:rPr lang="en-GB" smtClean="0"/>
-              <a:t>03/03/20</a:t>
+              <a:t>04/03/20</a:t>
             </a:fld>
             <a:endParaRPr lang="en-GB"/>
           </a:p>
@@ -2331,7 +2331,7 @@
           <a:p>
             <a:fld id="{6869F073-CFE0-40B3-AEDA-CB2789305C2A}" type="datetimeFigureOut">
               <a:rPr lang="en-GB" smtClean="0"/>
-              <a:t>03/03/20</a:t>
+              <a:t>04/03/20</a:t>
             </a:fld>
             <a:endParaRPr lang="en-GB"/>
           </a:p>
@@ -2539,7 +2539,7 @@
           <a:p>
             <a:fld id="{6869F073-CFE0-40B3-AEDA-CB2789305C2A}" type="datetimeFigureOut">
               <a:rPr lang="en-GB" smtClean="0"/>
-              <a:t>03/03/20</a:t>
+              <a:t>04/03/20</a:t>
             </a:fld>
             <a:endParaRPr lang="en-GB"/>
           </a:p>
@@ -5108,15 +5108,15 @@
           <a:p>
             <a:r>
               <a:rPr lang="en-GB" sz="2400" dirty="0"/>
-              <a:t>CV K-means, Agglomerative </a:t>
-            </a:r>
-            <a:r>
-              <a:rPr lang="en-GB" sz="2400" dirty="0" err="1"/>
-              <a:t>Hierachicharical</a:t>
+              <a:t>CV K-means, </a:t>
+            </a:r>
+            <a:r>
+              <a:rPr lang="en-GB" sz="2400"/>
+              <a:t>Agglomerative Hierarchical </a:t>
             </a:r>
             <a:r>
               <a:rPr lang="en-GB" sz="2400" dirty="0"/>
-              <a:t> Clustering (AHC)</a:t>
+              <a:t>Clustering (AHC)</a:t>
             </a:r>
           </a:p>
         </p:txBody>
@@ -7154,8 +7154,8 @@
         </p:nvSpPr>
         <p:spPr>
           <a:xfrm>
-            <a:off x="2078239" y="4456511"/>
-            <a:ext cx="6322905" cy="461665"/>
+            <a:off x="2078240" y="5278226"/>
+            <a:ext cx="6322905" cy="830997"/>
           </a:xfrm>
           <a:prstGeom prst="rect">
             <a:avLst/>
@@ -7172,7 +7172,7 @@
               <a:rPr lang="en-GB" altLang="zh-CN" sz="2400" dirty="0">
                 <a:cs typeface="Segoe UI Semilight" panose="020B0402040204020203" pitchFamily="34" charset="0"/>
               </a:rPr>
-              <a:t>Future improvements and recommendations</a:t>
+              <a:t>Results , future improvements and recommendations</a:t>
             </a:r>
             <a:endParaRPr lang="zh-CN" altLang="en-US" sz="2400" dirty="0">
               <a:cs typeface="Segoe UI Semilight" panose="020B0402040204020203" pitchFamily="34" charset="0"/>
@@ -7210,7 +7210,7 @@
           <a:p>
             <a:r>
               <a:rPr lang="en-GB" sz="2400" dirty="0"/>
-              <a:t>Analysis, methods and results</a:t>
+              <a:t>Analysis, methods</a:t>
             </a:r>
           </a:p>
         </p:txBody>
@@ -7306,7 +7306,7 @@
         </p:nvSpPr>
         <p:spPr>
           <a:xfrm>
-            <a:off x="2078238" y="5335712"/>
+            <a:off x="2078239" y="4522903"/>
             <a:ext cx="6322905" cy="461665"/>
           </a:xfrm>
           <a:prstGeom prst="rect">
@@ -7423,7 +7423,7 @@
         </p:nvSpPr>
         <p:spPr>
           <a:xfrm>
-            <a:off x="2121714" y="6040351"/>
+            <a:off x="2121714" y="6172048"/>
             <a:ext cx="6322905" cy="461665"/>
           </a:xfrm>
           <a:prstGeom prst="rect">
@@ -8212,7 +8212,7 @@
           <p:nvPr>
             <p:extLst>
               <p:ext uri="{D42A27DB-BD31-4B8C-83A1-F6EECF244321}">
-                <p14:modId xmlns:p14="http://schemas.microsoft.com/office/powerpoint/2010/main" val="3736494671"/>
+                <p14:modId xmlns:p14="http://schemas.microsoft.com/office/powerpoint/2010/main" val="2823234624"/>
               </p:ext>
             </p:extLst>
           </p:nvPr>
@@ -8719,6 +8719,43 @@
           </a:p>
         </p:txBody>
       </p:sp>
+      <p:sp>
+        <p:nvSpPr>
+          <p:cNvPr id="6" name="Rectangle 5">
+            <a:extLst>
+              <a:ext uri="{FF2B5EF4-FFF2-40B4-BE49-F238E27FC236}">
+                <a16:creationId xmlns:a16="http://schemas.microsoft.com/office/drawing/2014/main" id="{085C115C-3954-41B2-AD62-F2F4C90E7DE3}"/>
+              </a:ext>
+            </a:extLst>
+          </p:cNvPr>
+          <p:cNvSpPr/>
+          <p:nvPr/>
+        </p:nvSpPr>
+        <p:spPr>
+          <a:xfrm>
+            <a:off x="1423237" y="5061831"/>
+            <a:ext cx="4034246" cy="369332"/>
+          </a:xfrm>
+          <a:prstGeom prst="rect">
+            <a:avLst/>
+          </a:prstGeom>
+        </p:spPr>
+        <p:txBody>
+          <a:bodyPr wrap="none">
+            <a:spAutoFit/>
+          </a:bodyPr>
+          <a:lstStyle/>
+          <a:p>
+            <a:r>
+              <a:rPr lang="en-GB" dirty="0">
+                <a:hlinkClick r:id="rId4"/>
+              </a:rPr>
+              <a:t>https://brownsey.shinyapps.io/shinyapp/</a:t>
+            </a:r>
+            <a:endParaRPr lang="en-GB" dirty="0"/>
+          </a:p>
+        </p:txBody>
+      </p:sp>
     </p:spTree>
   </p:cSld>
   <p:clrMapOvr>
@@ -9222,7 +9259,7 @@
               <a:rPr lang="en-GB" altLang="zh-CN" sz="2400" dirty="0">
                 <a:cs typeface="Segoe UI Semilight" panose="020B0402040204020203" pitchFamily="34" charset="0"/>
               </a:rPr>
-              <a:t>Going forward – more automated data collection</a:t>
+              <a:t>Insufficient data to conclude optimum method</a:t>
             </a:r>
             <a:endParaRPr lang="zh-CN" altLang="en-US" sz="2400" dirty="0">
               <a:cs typeface="Segoe UI Semilight" panose="020B0402040204020203" pitchFamily="34" charset="0"/>
@@ -9339,7 +9376,7 @@
               <a:rPr lang="en-GB" altLang="zh-CN" sz="2400" dirty="0">
                 <a:cs typeface="Segoe UI Semilight" panose="020B0402040204020203" pitchFamily="34" charset="0"/>
               </a:rPr>
-              <a:t>Non-standardised pesticide results formed better than standardised ones</a:t>
+              <a:t>Raw (non-standardised) pesticide results formed better than standardised ones</a:t>
             </a:r>
             <a:endParaRPr lang="zh-CN" altLang="en-US" sz="2400" dirty="0">
               <a:cs typeface="Segoe UI Semilight" panose="020B0402040204020203" pitchFamily="34" charset="0"/>
@@ -9914,7 +9951,7 @@
         </p:nvSpPr>
         <p:spPr>
           <a:xfrm>
-            <a:off x="2112345" y="3493434"/>
+            <a:off x="2112345" y="3772795"/>
             <a:ext cx="7502434" cy="461665"/>
           </a:xfrm>
           <a:prstGeom prst="rect">
@@ -10151,7 +10188,7 @@
         <p:spPr>
           <a:xfrm>
             <a:off x="1443793" y="5185919"/>
-            <a:ext cx="9462332" cy="1477328"/>
+            <a:ext cx="9462332" cy="1754326"/>
           </a:xfrm>
           <a:prstGeom prst="rect">
             <a:avLst/>
@@ -10178,17 +10215,34 @@
               </a:rPr>
               <a:t>https://brownsey.shinyapps.io/shinyapp/</a:t>
             </a:r>
-            <a:endParaRPr lang="en-GB" altLang="zh-CN" dirty="0"/>
+            <a:endParaRPr lang="en-GB" dirty="0"/>
           </a:p>
           <a:p>
             <a:r>
               <a:rPr lang="en-GB" altLang="zh-CN" dirty="0"/>
-              <a:t>GitHub: </a:t>
+              <a:t>Shiny Gantt Chart: </a:t>
+            </a:r>
+            <a:r>
+              <a:rPr lang="en-GB" dirty="0"/>
+              <a:t> </a:t>
             </a:r>
             <a:r>
               <a:rPr lang="en-GB" dirty="0">
                 <a:hlinkClick r:id="rId5"/>
               </a:rPr>
+              <a:t>https://brownsey.shinyapps.io/brownsey_gantt/</a:t>
+            </a:r>
+            <a:endParaRPr lang="en-GB" altLang="zh-CN" dirty="0"/>
+          </a:p>
+          <a:p>
+            <a:r>
+              <a:rPr lang="en-GB" altLang="zh-CN" dirty="0"/>
+              <a:t>GitHub: </a:t>
+            </a:r>
+            <a:r>
+              <a:rPr lang="en-GB" dirty="0">
+                <a:hlinkClick r:id="rId6"/>
+              </a:rPr>
               <a:t>https://github.com/Brownsey/wild_pollinators</a:t>
             </a:r>
             <a:endParaRPr lang="en-GB" altLang="zh-CN" dirty="0"/>
@@ -10197,24 +10251,24 @@
             <a:r>
               <a:rPr lang="en-GB" altLang="zh-CN" dirty="0"/>
               <a:t>Email: </a:t>
-            </a:r>
-            <a:r>
-              <a:rPr lang="en-GB" altLang="zh-CN" dirty="0">
-                <a:hlinkClick r:id="rId6"/>
-              </a:rPr>
-              <a:t>S.Brownsey@warwick.ac.uk</a:t>
-            </a:r>
-            <a:endParaRPr lang="en-GB" altLang="zh-CN" dirty="0"/>
-          </a:p>
-          <a:p>
-            <a:r>
-              <a:rPr lang="en-GB" altLang="zh-CN" dirty="0"/>
-              <a:t>Original Research: </a:t>
             </a:r>
             <a:r>
               <a:rPr lang="en-GB" altLang="zh-CN" dirty="0">
                 <a:hlinkClick r:id="rId7"/>
               </a:rPr>
+              <a:t>S.Brownsey@warwick.ac.uk</a:t>
+            </a:r>
+            <a:endParaRPr lang="en-GB" altLang="zh-CN" dirty="0"/>
+          </a:p>
+          <a:p>
+            <a:r>
+              <a:rPr lang="en-GB" altLang="zh-CN" dirty="0"/>
+              <a:t>Original Research: </a:t>
+            </a:r>
+            <a:r>
+              <a:rPr lang="en-GB" altLang="zh-CN" dirty="0">
+                <a:hlinkClick r:id="rId8"/>
+              </a:rPr>
               <a:t>https://royalsocietypublishing.org/doi/pdf/10.1098/rspb.2015.0299</a:t>
             </a:r>
             <a:endParaRPr lang="en-GB" altLang="zh-CN" dirty="0"/>
@@ -10238,7 +10292,7 @@
         </p:nvSpPr>
         <p:spPr>
           <a:xfrm>
-            <a:off x="1443794" y="4724254"/>
+            <a:off x="1443793" y="4599381"/>
             <a:ext cx="2070932" cy="461665"/>
           </a:xfrm>
           <a:prstGeom prst="rect">
@@ -14493,7 +14547,7 @@
         </p:nvSpPr>
         <p:spPr>
           <a:xfrm>
-            <a:off x="2370366" y="3696897"/>
+            <a:off x="2370365" y="3757184"/>
             <a:ext cx="7236297" cy="830997"/>
           </a:xfrm>
           <a:prstGeom prst="rect">
@@ -14511,7 +14565,7 @@
               <a:rPr lang="en-GB" altLang="zh-CN" sz="2400" dirty="0">
                 <a:cs typeface="Segoe UI Semilight" panose="020B0402040204020203" pitchFamily="34" charset="0"/>
               </a:rPr>
-              <a:t>2a) Quantifying the different perspectives changed to Quantifying the different clustering methods </a:t>
+              <a:t>Quantifying the different perspectives changed to Quantifying the different clustering methods </a:t>
             </a:r>
             <a:endParaRPr lang="zh-CN" altLang="en-US" sz="2400" dirty="0">
               <a:cs typeface="Segoe UI Semilight" panose="020B0402040204020203" pitchFamily="34" charset="0"/>
@@ -14551,7 +14605,7 @@
               <a:rPr lang="en-GB" altLang="zh-CN" sz="2400" dirty="0">
                 <a:cs typeface="Segoe UI Semilight" panose="020B0402040204020203" pitchFamily="34" charset="0"/>
               </a:rPr>
-              <a:t>1d) alternative decision rules changed to alternative clustering methods</a:t>
+              <a:t>Alternative decision rules changed to alternative clustering methods</a:t>
             </a:r>
             <a:endParaRPr lang="zh-CN" altLang="en-US" sz="2400" dirty="0">
               <a:cs typeface="Segoe UI Semilight" panose="020B0402040204020203" pitchFamily="34" charset="0"/>
@@ -15009,7 +15063,7 @@
         </p:nvSpPr>
         <p:spPr>
           <a:xfrm>
-            <a:off x="2370366" y="3522167"/>
+            <a:off x="2242930" y="3506192"/>
             <a:ext cx="6800793" cy="830997"/>
           </a:xfrm>
           <a:prstGeom prst="rect">
@@ -15027,7 +15081,7 @@
               <a:rPr lang="en-GB" altLang="zh-CN" sz="2400" dirty="0">
                 <a:cs typeface="Segoe UI Semilight" panose="020B0402040204020203" pitchFamily="34" charset="0"/>
               </a:rPr>
-              <a:t>Objectives not self-contained, Iterative implementation</a:t>
+              <a:t>Objectives not self-contained, iterative implementation</a:t>
             </a:r>
             <a:endParaRPr lang="zh-CN" altLang="en-US" sz="2400" dirty="0">
               <a:cs typeface="Segoe UI Semilight" panose="020B0402040204020203" pitchFamily="34" charset="0"/>
@@ -15050,7 +15104,7 @@
         <p:spPr>
           <a:xfrm>
             <a:off x="2237299" y="2427647"/>
-            <a:ext cx="6698471" cy="461665"/>
+            <a:ext cx="6698471" cy="830997"/>
           </a:xfrm>
           <a:prstGeom prst="rect">
             <a:avLst/>
@@ -15067,7 +15121,7 @@
               <a:rPr lang="en-GB" altLang="zh-CN" sz="2400" dirty="0">
                 <a:cs typeface="Segoe UI Semilight" panose="020B0402040204020203" pitchFamily="34" charset="0"/>
               </a:rPr>
-              <a:t>Objective 1a) and 1d) took longer than expected</a:t>
+              <a:t>Exploratory data analysis and analysing the clustering methods took longer than expected</a:t>
             </a:r>
             <a:endParaRPr lang="zh-CN" altLang="en-US" sz="2400" dirty="0">
               <a:cs typeface="Segoe UI Semilight" panose="020B0402040204020203" pitchFamily="34" charset="0"/>
@@ -15140,7 +15194,7 @@
                 </a:solidFill>
                 <a:latin typeface="Arial Rounded MT Bold" panose="020F0704030504030204" pitchFamily="34" charset="0"/>
               </a:rPr>
-              <a:t>Problems Encountered (2)</a:t>
+              <a:t>Problems Encountered (data)</a:t>
             </a:r>
             <a:endParaRPr lang="en-GB" dirty="0"/>
           </a:p>

</xml_diff>